<commit_message>
add new slides + update sprekers
</commit_message>
<xml_diff>
--- a/16maart/slides/05 Slides Pacman effect.pptx
+++ b/16maart/slides/05 Slides Pacman effect.pptx
@@ -5,17 +5,18 @@
     <p:sldMasterId id="2147483684" r:id="rId1"/>
   </p:sldMasterIdLst>
   <p:notesMasterIdLst>
-    <p:notesMasterId r:id="rId7"/>
+    <p:notesMasterId r:id="rId8"/>
   </p:notesMasterIdLst>
   <p:handoutMasterIdLst>
-    <p:handoutMasterId r:id="rId8"/>
+    <p:handoutMasterId r:id="rId9"/>
   </p:handoutMasterIdLst>
   <p:sldIdLst>
     <p:sldId id="260" r:id="rId2"/>
     <p:sldId id="259" r:id="rId3"/>
     <p:sldId id="261" r:id="rId4"/>
     <p:sldId id="262" r:id="rId5"/>
-    <p:sldId id="256" r:id="rId6"/>
+    <p:sldId id="263" r:id="rId6"/>
+    <p:sldId id="256" r:id="rId7"/>
   </p:sldIdLst>
   <p:sldSz cx="12192000" cy="6858000"/>
   <p:notesSz cx="6858000" cy="9144000"/>
@@ -116,7 +117,7 @@
   </p:defaultTextStyle>
   <p:extLst>
     <p:ext uri="{EFAFB233-063F-42B5-8137-9DF3F51BA10A}">
-      <p15:sldGuideLst xmlns:p15="http://schemas.microsoft.com/office/powerpoint/2012/main"/>
+      <p15:sldGuideLst xmlns:p15="http://schemas.microsoft.com/office/powerpoint/2012/main" xmlns=""/>
     </p:ext>
   </p:extLst>
 </p:presentation>
@@ -204,7 +205,7 @@
           <a:p>
             <a:fld id="{15E150AF-FB20-7549-8EBD-91871A75589D}" type="datetimeFigureOut">
               <a:rPr lang="en-US" smtClean="0"/>
-              <a:t>3/7/18</a:t>
+              <a:t>11-03-18</a:t>
             </a:fld>
             <a:endParaRPr lang="en-US"/>
           </a:p>
@@ -270,7 +271,7 @@
           <a:p>
             <a:fld id="{51932590-6358-5E4A-9579-8F9BBAA1D21E}" type="slidenum">
               <a:rPr lang="en-US" smtClean="0"/>
-              <a:t>‹#›</a:t>
+              <a:t>‹nr.›</a:t>
             </a:fld>
             <a:endParaRPr lang="en-US"/>
           </a:p>
@@ -369,7 +370,7 @@
           <a:p>
             <a:fld id="{38B8A568-4DDB-4D44-8804-F2D344CBA7D9}" type="datetimeFigureOut">
               <a:rPr lang="en-US" smtClean="0"/>
-              <a:t>3/7/18</a:t>
+              <a:t>11-03-18</a:t>
             </a:fld>
             <a:endParaRPr lang="en-US"/>
           </a:p>
@@ -527,7 +528,7 @@
           <a:p>
             <a:fld id="{E0FBD6F4-CD9B-584A-A34E-649C473A2777}" type="slidenum">
               <a:rPr lang="en-US" smtClean="0"/>
-              <a:t>‹#›</a:t>
+              <a:t>‹nr.›</a:t>
             </a:fld>
             <a:endParaRPr lang="en-US"/>
           </a:p>
@@ -3400,7 +3401,7 @@
   <p:timing>
     <p:tnLst>
       <p:par>
-        <p:cTn id="1" dur="indefinite" restart="never" nodeType="tmRoot">
+        <p:cTn xmlns:p14="http://schemas.microsoft.com/office/powerpoint/2010/main" id="1" dur="indefinite" restart="never" nodeType="tmRoot">
           <p:childTnLst>
             <p:seq concurrent="1" nextAc="seek">
               <p:cTn id="2" dur="indefinite" nodeType="mainSeq">
@@ -3504,6 +3505,36 @@
           <a:chExt cx="0" cy="0"/>
         </a:xfrm>
       </p:grpSpPr>
+      <p:pic>
+        <p:nvPicPr>
+          <p:cNvPr id="2" name="Afbeelding 1" descr="pacman.jpeg"/>
+          <p:cNvPicPr>
+            <a:picLocks noChangeAspect="1"/>
+          </p:cNvPicPr>
+          <p:nvPr/>
+        </p:nvPicPr>
+        <p:blipFill>
+          <a:blip r:embed="rId2">
+            <a:extLst>
+              <a:ext uri="{28A0092B-C50C-407E-A947-70E740481C1C}">
+                <a14:useLocalDpi xmlns:a14="http://schemas.microsoft.com/office/drawing/2010/main" val="0"/>
+              </a:ext>
+            </a:extLst>
+          </a:blip>
+          <a:stretch>
+            <a:fillRect/>
+          </a:stretch>
+        </p:blipFill>
+        <p:spPr>
+          <a:xfrm>
+            <a:off x="0" y="-381000"/>
+            <a:ext cx="12192000" cy="7620000"/>
+          </a:xfrm>
+          <a:prstGeom prst="rect">
+            <a:avLst/>
+          </a:prstGeom>
+        </p:spPr>
+      </p:pic>
     </p:spTree>
     <p:extLst>
       <p:ext uri="{BB962C8B-B14F-4D97-AF65-F5344CB8AC3E}">
@@ -3517,7 +3548,7 @@
   <p:timing>
     <p:tnLst>
       <p:par>
-        <p:cTn id="1" dur="indefinite" restart="never" nodeType="tmRoot"/>
+        <p:cTn xmlns:p14="http://schemas.microsoft.com/office/powerpoint/2010/main" id="1" dur="indefinite" restart="never" nodeType="tmRoot"/>
       </p:par>
     </p:tnLst>
   </p:timing>
@@ -3525,6 +3556,111 @@
 </file>
 
 <file path=ppt/slides/slide5.xml><?xml version="1.0" encoding="utf-8"?>
+<p:sld xmlns:a="http://schemas.openxmlformats.org/drawingml/2006/main" xmlns:r="http://schemas.openxmlformats.org/officeDocument/2006/relationships" xmlns:p="http://schemas.openxmlformats.org/presentationml/2006/main">
+  <p:cSld>
+    <p:spTree>
+      <p:nvGrpSpPr>
+        <p:cNvPr id="1" name=""/>
+        <p:cNvGrpSpPr/>
+        <p:nvPr/>
+      </p:nvGrpSpPr>
+      <p:grpSpPr>
+        <a:xfrm>
+          <a:off x="0" y="0"/>
+          <a:ext cx="0" cy="0"/>
+          <a:chOff x="0" y="0"/>
+          <a:chExt cx="0" cy="0"/>
+        </a:xfrm>
+      </p:grpSpPr>
+      <p:sp>
+        <p:nvSpPr>
+          <p:cNvPr id="2" name="Titel 1"/>
+          <p:cNvSpPr>
+            <a:spLocks noGrp="1"/>
+          </p:cNvSpPr>
+          <p:nvPr>
+            <p:ph type="ctrTitle"/>
+          </p:nvPr>
+        </p:nvSpPr>
+        <p:spPr/>
+        <p:txBody>
+          <a:bodyPr/>
+          <a:lstStyle/>
+          <a:p>
+            <a:endParaRPr lang="nl-NL"/>
+          </a:p>
+        </p:txBody>
+      </p:sp>
+      <p:sp>
+        <p:nvSpPr>
+          <p:cNvPr id="3" name="Subtitel 2"/>
+          <p:cNvSpPr>
+            <a:spLocks noGrp="1"/>
+          </p:cNvSpPr>
+          <p:nvPr>
+            <p:ph type="subTitle" idx="1"/>
+          </p:nvPr>
+        </p:nvSpPr>
+        <p:spPr/>
+        <p:txBody>
+          <a:bodyPr/>
+          <a:lstStyle/>
+          <a:p>
+            <a:endParaRPr lang="nl-NL"/>
+          </a:p>
+        </p:txBody>
+      </p:sp>
+      <p:pic>
+        <p:nvPicPr>
+          <p:cNvPr id="5" name="Afbeelding 4" descr="Pac-man.png"/>
+          <p:cNvPicPr>
+            <a:picLocks noChangeAspect="1"/>
+          </p:cNvPicPr>
+          <p:nvPr/>
+        </p:nvPicPr>
+        <p:blipFill>
+          <a:blip r:embed="rId2">
+            <a:extLst>
+              <a:ext uri="{28A0092B-C50C-407E-A947-70E740481C1C}">
+                <a14:useLocalDpi xmlns:a14="http://schemas.microsoft.com/office/drawing/2010/main" val="0"/>
+              </a:ext>
+            </a:extLst>
+          </a:blip>
+          <a:stretch>
+            <a:fillRect/>
+          </a:stretch>
+        </p:blipFill>
+        <p:spPr>
+          <a:xfrm>
+            <a:off x="0" y="0"/>
+            <a:ext cx="12192000" cy="6858000"/>
+          </a:xfrm>
+          <a:prstGeom prst="rect">
+            <a:avLst/>
+          </a:prstGeom>
+        </p:spPr>
+      </p:pic>
+    </p:spTree>
+    <p:extLst>
+      <p:ext uri="{BB962C8B-B14F-4D97-AF65-F5344CB8AC3E}">
+        <p14:creationId xmlns:p14="http://schemas.microsoft.com/office/powerpoint/2010/main" val="936331607"/>
+      </p:ext>
+    </p:extLst>
+  </p:cSld>
+  <p:clrMapOvr>
+    <a:masterClrMapping/>
+  </p:clrMapOvr>
+  <p:timing>
+    <p:tnLst>
+      <p:par>
+        <p:cTn xmlns:p14="http://schemas.microsoft.com/office/powerpoint/2010/main" id="1" dur="indefinite" restart="never" nodeType="tmRoot"/>
+      </p:par>
+    </p:tnLst>
+  </p:timing>
+</p:sld>
+</file>
+
+<file path=ppt/slides/slide6.xml><?xml version="1.0" encoding="utf-8"?>
 <p:sld xmlns:a="http://schemas.openxmlformats.org/drawingml/2006/main" xmlns:r="http://schemas.openxmlformats.org/officeDocument/2006/relationships" xmlns:p="http://schemas.openxmlformats.org/presentationml/2006/main">
   <p:cSld>
     <p:spTree>
@@ -3597,7 +3733,7 @@
     </a:clrScheme>
     <a:fontScheme name="Arial Black-Arial">
       <a:majorFont>
-        <a:latin typeface="Arial Black" panose="020B0A04020102020204"/>
+        <a:latin typeface="Arial Black"/>
         <a:ea typeface=""/>
         <a:cs typeface=""/>
         <a:font script="Jpan" typeface="ＭＳ ゴシック"/>
@@ -3632,7 +3768,7 @@
         <a:font script="Geor" typeface="Sylfaen"/>
       </a:majorFont>
       <a:minorFont>
-        <a:latin typeface="Arial" panose="020B0604020202020204"/>
+        <a:latin typeface="Arial"/>
         <a:ea typeface=""/>
         <a:cs typeface=""/>
         <a:font script="Jpan" typeface="ＭＳ Ｐゴシック"/>
@@ -3809,7 +3945,7 @@
   <a:extraClrSchemeLst/>
   <a:extLst>
     <a:ext uri="{05A4C25C-085E-4340-85A3-A5531E510DB2}">
-      <thm15:themeFamily xmlns:thm15="http://schemas.microsoft.com/office/thememl/2012/main" name="tedxamstelveen-2018" id="{F0191121-869C-FD45-BBDC-C820C6FC9C87}" vid="{0637F1E7-961D-7E47-903B-C3A1A9F3C37F}"/>
+      <thm15:themeFamily xmlns:thm15="http://schemas.microsoft.com/office/thememl/2012/main" xmlns="" name="tedxamstelveen-2018" id="{F0191121-869C-FD45-BBDC-C820C6FC9C87}" vid="{0637F1E7-961D-7E47-903B-C3A1A9F3C37F}"/>
     </a:ext>
   </a:extLst>
 </a:theme>
@@ -3858,7 +3994,7 @@
     </a:clrScheme>
     <a:fontScheme name="Office">
       <a:majorFont>
-        <a:latin typeface="Calibri Light" panose="020F0302020204030204"/>
+        <a:latin typeface="Calibri Light"/>
         <a:ea typeface=""/>
         <a:cs typeface=""/>
         <a:font script="Jpan" typeface="Yu Gothic Light"/>
@@ -3893,7 +4029,7 @@
         <a:font script="Geor" typeface="Sylfaen"/>
       </a:majorFont>
       <a:minorFont>
-        <a:latin typeface="Calibri" panose="020F0502020204030204"/>
+        <a:latin typeface="Calibri"/>
         <a:ea typeface=""/>
         <a:cs typeface=""/>
         <a:font script="Jpan" typeface="Yu Gothic"/>
@@ -4070,7 +4206,7 @@
   <a:extraClrSchemeLst/>
   <a:extLst>
     <a:ext uri="{05A4C25C-085E-4340-85A3-A5531E510DB2}">
-      <thm15:themeFamily xmlns:thm15="http://schemas.microsoft.com/office/thememl/2012/main" name="Office Theme" id="{62F939B6-93AF-4DB8-9C6B-D6C7DFDC589F}" vid="{4A3C46E8-61CC-4603-A589-7422A47A8E4A}"/>
+      <thm15:themeFamily xmlns:thm15="http://schemas.microsoft.com/office/thememl/2012/main" xmlns="" name="Office Theme" id="{62F939B6-93AF-4DB8-9C6B-D6C7DFDC589F}" vid="{4A3C46E8-61CC-4603-A589-7422A47A8E4A}"/>
     </a:ext>
   </a:extLst>
 </a:theme>
@@ -4119,7 +4255,7 @@
     </a:clrScheme>
     <a:fontScheme name="Office">
       <a:majorFont>
-        <a:latin typeface="Calibri Light" panose="020F0302020204030204"/>
+        <a:latin typeface="Calibri Light"/>
         <a:ea typeface=""/>
         <a:cs typeface=""/>
         <a:font script="Jpan" typeface="Yu Gothic Light"/>
@@ -4154,7 +4290,7 @@
         <a:font script="Geor" typeface="Sylfaen"/>
       </a:majorFont>
       <a:minorFont>
-        <a:latin typeface="Calibri" panose="020F0502020204030204"/>
+        <a:latin typeface="Calibri"/>
         <a:ea typeface=""/>
         <a:cs typeface=""/>
         <a:font script="Jpan" typeface="Yu Gothic"/>
@@ -4331,7 +4467,7 @@
   <a:extraClrSchemeLst/>
   <a:extLst>
     <a:ext uri="{05A4C25C-085E-4340-85A3-A5531E510DB2}">
-      <thm15:themeFamily xmlns:thm15="http://schemas.microsoft.com/office/thememl/2012/main" name="Office Theme" id="{62F939B6-93AF-4DB8-9C6B-D6C7DFDC589F}" vid="{4A3C46E8-61CC-4603-A589-7422A47A8E4A}"/>
+      <thm15:themeFamily xmlns:thm15="http://schemas.microsoft.com/office/thememl/2012/main" xmlns="" name="Office Theme" id="{62F939B6-93AF-4DB8-9C6B-D6C7DFDC589F}" vid="{4A3C46E8-61CC-4603-A589-7422A47A8E4A}"/>
     </a:ext>
   </a:extLst>
 </a:theme>

</xml_diff>